<commit_message>
Updated canadensis to canadense
</commit_message>
<xml_diff>
--- a/Figure_S2_enrichment_culturing/Figure_S2.pptx
+++ b/Figure_S2_enrichment_culturing/Figure_S2.pptx
@@ -243,7 +243,7 @@
           <a:p>
             <a:fld id="{433C4CA6-807F-4625-8651-D91FAA5CBC45}" type="datetimeFigureOut">
               <a:rPr lang="en-CA" smtClean="0"/>
-              <a:t>2020-01-10</a:t>
+              <a:t>2020-02-18</a:t>
             </a:fld>
             <a:endParaRPr lang="en-CA"/>
           </a:p>
@@ -413,7 +413,7 @@
           <a:p>
             <a:fld id="{433C4CA6-807F-4625-8651-D91FAA5CBC45}" type="datetimeFigureOut">
               <a:rPr lang="en-CA" smtClean="0"/>
-              <a:t>2020-01-10</a:t>
+              <a:t>2020-02-18</a:t>
             </a:fld>
             <a:endParaRPr lang="en-CA"/>
           </a:p>
@@ -593,7 +593,7 @@
           <a:p>
             <a:fld id="{433C4CA6-807F-4625-8651-D91FAA5CBC45}" type="datetimeFigureOut">
               <a:rPr lang="en-CA" smtClean="0"/>
-              <a:t>2020-01-10</a:t>
+              <a:t>2020-02-18</a:t>
             </a:fld>
             <a:endParaRPr lang="en-CA"/>
           </a:p>
@@ -763,7 +763,7 @@
           <a:p>
             <a:fld id="{433C4CA6-807F-4625-8651-D91FAA5CBC45}" type="datetimeFigureOut">
               <a:rPr lang="en-CA" smtClean="0"/>
-              <a:t>2020-01-10</a:t>
+              <a:t>2020-02-18</a:t>
             </a:fld>
             <a:endParaRPr lang="en-CA"/>
           </a:p>
@@ -1007,7 +1007,7 @@
           <a:p>
             <a:fld id="{433C4CA6-807F-4625-8651-D91FAA5CBC45}" type="datetimeFigureOut">
               <a:rPr lang="en-CA" smtClean="0"/>
-              <a:t>2020-01-10</a:t>
+              <a:t>2020-02-18</a:t>
             </a:fld>
             <a:endParaRPr lang="en-CA"/>
           </a:p>
@@ -1239,7 +1239,7 @@
           <a:p>
             <a:fld id="{433C4CA6-807F-4625-8651-D91FAA5CBC45}" type="datetimeFigureOut">
               <a:rPr lang="en-CA" smtClean="0"/>
-              <a:t>2020-01-10</a:t>
+              <a:t>2020-02-18</a:t>
             </a:fld>
             <a:endParaRPr lang="en-CA"/>
           </a:p>
@@ -1606,7 +1606,7 @@
           <a:p>
             <a:fld id="{433C4CA6-807F-4625-8651-D91FAA5CBC45}" type="datetimeFigureOut">
               <a:rPr lang="en-CA" smtClean="0"/>
-              <a:t>2020-01-10</a:t>
+              <a:t>2020-02-18</a:t>
             </a:fld>
             <a:endParaRPr lang="en-CA"/>
           </a:p>
@@ -1724,7 +1724,7 @@
           <a:p>
             <a:fld id="{433C4CA6-807F-4625-8651-D91FAA5CBC45}" type="datetimeFigureOut">
               <a:rPr lang="en-CA" smtClean="0"/>
-              <a:t>2020-01-10</a:t>
+              <a:t>2020-02-18</a:t>
             </a:fld>
             <a:endParaRPr lang="en-CA"/>
           </a:p>
@@ -1819,7 +1819,7 @@
           <a:p>
             <a:fld id="{433C4CA6-807F-4625-8651-D91FAA5CBC45}" type="datetimeFigureOut">
               <a:rPr lang="en-CA" smtClean="0"/>
-              <a:t>2020-01-10</a:t>
+              <a:t>2020-02-18</a:t>
             </a:fld>
             <a:endParaRPr lang="en-CA"/>
           </a:p>
@@ -2096,7 +2096,7 @@
           <a:p>
             <a:fld id="{433C4CA6-807F-4625-8651-D91FAA5CBC45}" type="datetimeFigureOut">
               <a:rPr lang="en-CA" smtClean="0"/>
-              <a:t>2020-01-10</a:t>
+              <a:t>2020-02-18</a:t>
             </a:fld>
             <a:endParaRPr lang="en-CA"/>
           </a:p>
@@ -2353,7 +2353,7 @@
           <a:p>
             <a:fld id="{433C4CA6-807F-4625-8651-D91FAA5CBC45}" type="datetimeFigureOut">
               <a:rPr lang="en-CA" smtClean="0"/>
-              <a:t>2020-01-10</a:t>
+              <a:t>2020-02-18</a:t>
             </a:fld>
             <a:endParaRPr lang="en-CA"/>
           </a:p>
@@ -2566,7 +2566,7 @@
           <a:p>
             <a:fld id="{433C4CA6-807F-4625-8651-D91FAA5CBC45}" type="datetimeFigureOut">
               <a:rPr lang="en-CA" smtClean="0"/>
-              <a:t>2020-01-10</a:t>
+              <a:t>2020-02-18</a:t>
             </a:fld>
             <a:endParaRPr lang="en-CA"/>
           </a:p>
@@ -3674,7 +3674,7 @@
                   <a:latin typeface="Arial" panose="020B0604020202020204" pitchFamily="34" charset="0"/>
                   <a:cs typeface="Arial" panose="020B0604020202020204" pitchFamily="34" charset="0"/>
                 </a:rPr>
-                <a:t> Chl. canadensis L304-6D”</a:t>
+                <a:t> Chl. canadense L304-6D”</a:t>
               </a:r>
             </a:p>
           </p:txBody>

</xml_diff>